<commit_message>
another week 5 commit
</commit_message>
<xml_diff>
--- a/students/u3201052/wk3/wk3exercise_flowchart.pptx
+++ b/students/u3201052/wk3/wk3exercise_flowchart.pptx
@@ -262,7 +262,7 @@
           <a:p>
             <a:fld id="{B0E8B34E-6603-4888-8622-269D13050B01}" type="datetimeFigureOut">
               <a:rPr lang="en-AU" smtClean="0"/>
-              <a:t>31/08/2020</a:t>
+              <a:t>6/09/2020</a:t>
             </a:fld>
             <a:endParaRPr lang="en-AU"/>
           </a:p>
@@ -462,7 +462,7 @@
           <a:p>
             <a:fld id="{B0E8B34E-6603-4888-8622-269D13050B01}" type="datetimeFigureOut">
               <a:rPr lang="en-AU" smtClean="0"/>
-              <a:t>31/08/2020</a:t>
+              <a:t>6/09/2020</a:t>
             </a:fld>
             <a:endParaRPr lang="en-AU"/>
           </a:p>
@@ -672,7 +672,7 @@
           <a:p>
             <a:fld id="{B0E8B34E-6603-4888-8622-269D13050B01}" type="datetimeFigureOut">
               <a:rPr lang="en-AU" smtClean="0"/>
-              <a:t>31/08/2020</a:t>
+              <a:t>6/09/2020</a:t>
             </a:fld>
             <a:endParaRPr lang="en-AU"/>
           </a:p>
@@ -872,7 +872,7 @@
           <a:p>
             <a:fld id="{B0E8B34E-6603-4888-8622-269D13050B01}" type="datetimeFigureOut">
               <a:rPr lang="en-AU" smtClean="0"/>
-              <a:t>31/08/2020</a:t>
+              <a:t>6/09/2020</a:t>
             </a:fld>
             <a:endParaRPr lang="en-AU"/>
           </a:p>
@@ -1148,7 +1148,7 @@
           <a:p>
             <a:fld id="{B0E8B34E-6603-4888-8622-269D13050B01}" type="datetimeFigureOut">
               <a:rPr lang="en-AU" smtClean="0"/>
-              <a:t>31/08/2020</a:t>
+              <a:t>6/09/2020</a:t>
             </a:fld>
             <a:endParaRPr lang="en-AU"/>
           </a:p>
@@ -1416,7 +1416,7 @@
           <a:p>
             <a:fld id="{B0E8B34E-6603-4888-8622-269D13050B01}" type="datetimeFigureOut">
               <a:rPr lang="en-AU" smtClean="0"/>
-              <a:t>31/08/2020</a:t>
+              <a:t>6/09/2020</a:t>
             </a:fld>
             <a:endParaRPr lang="en-AU"/>
           </a:p>
@@ -1831,7 +1831,7 @@
           <a:p>
             <a:fld id="{B0E8B34E-6603-4888-8622-269D13050B01}" type="datetimeFigureOut">
               <a:rPr lang="en-AU" smtClean="0"/>
-              <a:t>31/08/2020</a:t>
+              <a:t>6/09/2020</a:t>
             </a:fld>
             <a:endParaRPr lang="en-AU"/>
           </a:p>
@@ -1973,7 +1973,7 @@
           <a:p>
             <a:fld id="{B0E8B34E-6603-4888-8622-269D13050B01}" type="datetimeFigureOut">
               <a:rPr lang="en-AU" smtClean="0"/>
-              <a:t>31/08/2020</a:t>
+              <a:t>6/09/2020</a:t>
             </a:fld>
             <a:endParaRPr lang="en-AU"/>
           </a:p>
@@ -2086,7 +2086,7 @@
           <a:p>
             <a:fld id="{B0E8B34E-6603-4888-8622-269D13050B01}" type="datetimeFigureOut">
               <a:rPr lang="en-AU" smtClean="0"/>
-              <a:t>31/08/2020</a:t>
+              <a:t>6/09/2020</a:t>
             </a:fld>
             <a:endParaRPr lang="en-AU"/>
           </a:p>
@@ -2399,7 +2399,7 @@
           <a:p>
             <a:fld id="{B0E8B34E-6603-4888-8622-269D13050B01}" type="datetimeFigureOut">
               <a:rPr lang="en-AU" smtClean="0"/>
-              <a:t>31/08/2020</a:t>
+              <a:t>6/09/2020</a:t>
             </a:fld>
             <a:endParaRPr lang="en-AU"/>
           </a:p>
@@ -2688,7 +2688,7 @@
           <a:p>
             <a:fld id="{B0E8B34E-6603-4888-8622-269D13050B01}" type="datetimeFigureOut">
               <a:rPr lang="en-AU" smtClean="0"/>
-              <a:t>31/08/2020</a:t>
+              <a:t>6/09/2020</a:t>
             </a:fld>
             <a:endParaRPr lang="en-AU"/>
           </a:p>
@@ -2931,7 +2931,7 @@
           <a:p>
             <a:fld id="{B0E8B34E-6603-4888-8622-269D13050B01}" type="datetimeFigureOut">
               <a:rPr lang="en-AU" smtClean="0"/>
-              <a:t>31/08/2020</a:t>
+              <a:t>6/09/2020</a:t>
             </a:fld>
             <a:endParaRPr lang="en-AU"/>
           </a:p>
@@ -4612,8 +4612,12 @@
           </a:p>
           <a:p>
             <a:r>
+              <a:rPr lang="en-AU" sz="1400" dirty="0" err="1"/>
+              <a:t>ScheduledTime</a:t>
+            </a:r>
+            <a:r>
               <a:rPr lang="en-AU" sz="1400" dirty="0"/>
-              <a:t>Afternoon = “9:15am”</a:t>
+              <a:t> = “9:15am”</a:t>
             </a:r>
           </a:p>
           <a:p>

</xml_diff>